<commit_message>
added ans button and extra note section to answer + error handling
</commit_message>
<xml_diff>
--- a/docs/equationSolverPresentation.pptx
+++ b/docs/equationSolverPresentation.pptx
@@ -5,13 +5,15 @@
     <p:sldMasterId id="2147483648" r:id="rId1"/>
   </p:sldMasterIdLst>
   <p:notesMasterIdLst>
-    <p:notesMasterId r:id="rId6"/>
+    <p:notesMasterId r:id="rId8"/>
   </p:notesMasterIdLst>
   <p:sldIdLst>
     <p:sldId id="256" r:id="rId2"/>
     <p:sldId id="257" r:id="rId3"/>
     <p:sldId id="258" r:id="rId4"/>
     <p:sldId id="259" r:id="rId5"/>
+    <p:sldId id="260" r:id="rId6"/>
+    <p:sldId id="261" r:id="rId7"/>
   </p:sldIdLst>
   <p:sldSz cx="12192000" cy="6858000"/>
   <p:notesSz cx="6858000" cy="9144000"/>
@@ -110,6 +112,11 @@
       </a:defRPr>
     </a:lvl9pPr>
   </p:defaultTextStyle>
+  <p:extLst>
+    <p:ext uri="{EFAFB233-063F-42B5-8137-9DF3F51BA10A}">
+      <p15:sldGuideLst xmlns:p15="http://schemas.microsoft.com/office/powerpoint/2012/main"/>
+    </p:ext>
+  </p:extLst>
 </p:presentation>
 </file>
 
@@ -596,6 +603,14 @@
             </a:r>
           </a:p>
           <a:p>
+            <a:endParaRPr lang="en-GB" sz="1800" dirty="0">
+              <a:effectLst/>
+              <a:latin typeface="Calibri" panose="020F0502020204030204" pitchFamily="34" charset="0"/>
+              <a:ea typeface="Calibri" panose="020F0502020204030204" pitchFamily="34" charset="0"/>
+              <a:cs typeface="Times New Roman" panose="02020603050405020304" pitchFamily="18" charset="0"/>
+            </a:endParaRPr>
+          </a:p>
+          <a:p>
             <a:r>
               <a:rPr lang="en-GB" sz="1800" dirty="0">
                 <a:effectLst/>
@@ -603,8 +618,292 @@
                 <a:ea typeface="Calibri" panose="020F0502020204030204" pitchFamily="34" charset="0"/>
                 <a:cs typeface="Times New Roman" panose="02020603050405020304" pitchFamily="18" charset="0"/>
               </a:rPr>
-              <a:t>Academic – aids students in learning maths by allowing them to verify if an answer is correct</a:t>
-            </a:r>
+              <a:t>Academic:</a:t>
+            </a:r>
+          </a:p>
+          <a:p>
+            <a:r>
+              <a:rPr lang="en-GB" sz="1800" dirty="0">
+                <a:effectLst/>
+                <a:latin typeface="Calibri" panose="020F0502020204030204" pitchFamily="34" charset="0"/>
+                <a:ea typeface="Calibri" panose="020F0502020204030204" pitchFamily="34" charset="0"/>
+                <a:cs typeface="Times New Roman" panose="02020603050405020304" pitchFamily="18" charset="0"/>
+              </a:rPr>
+              <a:t>aids students in learning maths by allowing them to verify if an answer is correct</a:t>
+            </a:r>
+          </a:p>
+          <a:p>
+            <a:pPr marL="0" marR="0" lvl="0" indent="0" algn="l" defTabSz="914400" rtl="0" eaLnBrk="1" fontAlgn="auto" latinLnBrk="0" hangingPunct="1">
+              <a:lnSpc>
+                <a:spcPct val="100000"/>
+              </a:lnSpc>
+              <a:spcBef>
+                <a:spcPts val="0"/>
+              </a:spcBef>
+              <a:spcAft>
+                <a:spcPts val="0"/>
+              </a:spcAft>
+              <a:buClrTx/>
+              <a:buSzTx/>
+              <a:buFontTx/>
+              <a:buNone/>
+              <a:tabLst/>
+              <a:defRPr/>
+            </a:pPr>
+            <a:r>
+              <a:rPr lang="en-GB" sz="1800" dirty="0">
+                <a:effectLst/>
+                <a:latin typeface="Calibri" panose="020F0502020204030204" pitchFamily="34" charset="0"/>
+                <a:ea typeface="Calibri" panose="020F0502020204030204" pitchFamily="34" charset="0"/>
+                <a:cs typeface="Times New Roman" panose="02020603050405020304" pitchFamily="18" charset="0"/>
+              </a:rPr>
+              <a:t>Showing working out would also help them learn techniques to solve equations</a:t>
+            </a:r>
+          </a:p>
+          <a:p>
+            <a:pPr marL="0" marR="0" lvl="0" indent="0" algn="l" defTabSz="914400" rtl="0" eaLnBrk="1" fontAlgn="auto" latinLnBrk="0" hangingPunct="1">
+              <a:lnSpc>
+                <a:spcPct val="100000"/>
+              </a:lnSpc>
+              <a:spcBef>
+                <a:spcPts val="0"/>
+              </a:spcBef>
+              <a:spcAft>
+                <a:spcPts val="0"/>
+              </a:spcAft>
+              <a:buClrTx/>
+              <a:buSzTx/>
+              <a:buFontTx/>
+              <a:buNone/>
+              <a:tabLst/>
+              <a:defRPr/>
+            </a:pPr>
+            <a:endParaRPr lang="en-GB" sz="1800" dirty="0">
+              <a:effectLst/>
+              <a:latin typeface="Calibri" panose="020F0502020204030204" pitchFamily="34" charset="0"/>
+              <a:ea typeface="Calibri" panose="020F0502020204030204" pitchFamily="34" charset="0"/>
+              <a:cs typeface="Times New Roman" panose="02020603050405020304" pitchFamily="18" charset="0"/>
+            </a:endParaRPr>
+          </a:p>
+          <a:p>
+            <a:pPr marL="0" marR="0" lvl="0" indent="0" algn="l" defTabSz="914400" rtl="0" eaLnBrk="1" fontAlgn="auto" latinLnBrk="0" hangingPunct="1">
+              <a:lnSpc>
+                <a:spcPct val="100000"/>
+              </a:lnSpc>
+              <a:spcBef>
+                <a:spcPts val="0"/>
+              </a:spcBef>
+              <a:spcAft>
+                <a:spcPts val="0"/>
+              </a:spcAft>
+              <a:buClrTx/>
+              <a:buSzTx/>
+              <a:buFontTx/>
+              <a:buNone/>
+              <a:tabLst/>
+              <a:defRPr/>
+            </a:pPr>
+            <a:r>
+              <a:rPr lang="en-GB" sz="1800" dirty="0">
+                <a:effectLst/>
+                <a:latin typeface="Calibri" panose="020F0502020204030204" pitchFamily="34" charset="0"/>
+                <a:ea typeface="Calibri" panose="020F0502020204030204" pitchFamily="34" charset="0"/>
+                <a:cs typeface="Times New Roman" panose="02020603050405020304" pitchFamily="18" charset="0"/>
+              </a:rPr>
+              <a:t>Practical:</a:t>
+            </a:r>
+          </a:p>
+          <a:p>
+            <a:pPr marL="0" marR="0" lvl="0" indent="0" algn="l" defTabSz="914400" rtl="0" eaLnBrk="1" fontAlgn="auto" latinLnBrk="0" hangingPunct="1">
+              <a:lnSpc>
+                <a:spcPct val="100000"/>
+              </a:lnSpc>
+              <a:spcBef>
+                <a:spcPts val="0"/>
+              </a:spcBef>
+              <a:spcAft>
+                <a:spcPts val="0"/>
+              </a:spcAft>
+              <a:buClrTx/>
+              <a:buSzTx/>
+              <a:buFontTx/>
+              <a:buNone/>
+              <a:tabLst/>
+              <a:defRPr/>
+            </a:pPr>
+            <a:r>
+              <a:rPr lang="en-GB" sz="1800" dirty="0">
+                <a:effectLst/>
+                <a:latin typeface="Calibri" panose="020F0502020204030204" pitchFamily="34" charset="0"/>
+                <a:ea typeface="Calibri" panose="020F0502020204030204" pitchFamily="34" charset="0"/>
+                <a:cs typeface="Times New Roman" panose="02020603050405020304" pitchFamily="18" charset="0"/>
+              </a:rPr>
+              <a:t>Equations are used in a wide range of fields such as engineering, AI, data science, economics and more to </a:t>
+            </a:r>
+            <a:r>
+              <a:rPr lang="en-GB" sz="2800" dirty="0"/>
+              <a:t>model relationships, processes, and phenomena</a:t>
+            </a:r>
+          </a:p>
+          <a:p>
+            <a:pPr marL="0" marR="0" lvl="0" indent="0" algn="l" defTabSz="914400" rtl="0" eaLnBrk="1" fontAlgn="auto" latinLnBrk="0" hangingPunct="1">
+              <a:lnSpc>
+                <a:spcPct val="100000"/>
+              </a:lnSpc>
+              <a:spcBef>
+                <a:spcPts val="0"/>
+              </a:spcBef>
+              <a:spcAft>
+                <a:spcPts val="0"/>
+              </a:spcAft>
+              <a:buClrTx/>
+              <a:buSzTx/>
+              <a:buFontTx/>
+              <a:buNone/>
+              <a:tabLst/>
+              <a:defRPr/>
+            </a:pPr>
+            <a:r>
+              <a:rPr lang="en-GB" sz="2800" dirty="0">
+                <a:effectLst/>
+                <a:latin typeface="Calibri" panose="020F0502020204030204" pitchFamily="34" charset="0"/>
+                <a:ea typeface="Calibri" panose="020F0502020204030204" pitchFamily="34" charset="0"/>
+                <a:cs typeface="Times New Roman" panose="02020603050405020304" pitchFamily="18" charset="0"/>
+              </a:rPr>
+              <a:t>This tool allows them to utilise equations for quick and real answers</a:t>
+            </a:r>
+          </a:p>
+          <a:p>
+            <a:pPr marL="0" marR="0" lvl="0" indent="0" algn="l" defTabSz="914400" rtl="0" eaLnBrk="1" fontAlgn="auto" latinLnBrk="0" hangingPunct="1">
+              <a:lnSpc>
+                <a:spcPct val="100000"/>
+              </a:lnSpc>
+              <a:spcBef>
+                <a:spcPts val="0"/>
+              </a:spcBef>
+              <a:spcAft>
+                <a:spcPts val="0"/>
+              </a:spcAft>
+              <a:buClrTx/>
+              <a:buSzTx/>
+              <a:buFontTx/>
+              <a:buNone/>
+              <a:tabLst/>
+              <a:defRPr/>
+            </a:pPr>
+            <a:endParaRPr lang="en-GB" sz="2800" dirty="0">
+              <a:effectLst/>
+              <a:latin typeface="Calibri" panose="020F0502020204030204" pitchFamily="34" charset="0"/>
+              <a:ea typeface="Calibri" panose="020F0502020204030204" pitchFamily="34" charset="0"/>
+              <a:cs typeface="Times New Roman" panose="02020603050405020304" pitchFamily="18" charset="0"/>
+            </a:endParaRPr>
+          </a:p>
+          <a:p>
+            <a:pPr marL="0" marR="0" lvl="0" indent="0" algn="l" defTabSz="914400" rtl="0" eaLnBrk="1" fontAlgn="auto" latinLnBrk="0" hangingPunct="1">
+              <a:lnSpc>
+                <a:spcPct val="100000"/>
+              </a:lnSpc>
+              <a:spcBef>
+                <a:spcPts val="0"/>
+              </a:spcBef>
+              <a:spcAft>
+                <a:spcPts val="0"/>
+              </a:spcAft>
+              <a:buClrTx/>
+              <a:buSzTx/>
+              <a:buFontTx/>
+              <a:buNone/>
+              <a:tabLst/>
+              <a:defRPr/>
+            </a:pPr>
+            <a:endParaRPr lang="en-GB" sz="1800" dirty="0">
+              <a:effectLst/>
+              <a:latin typeface="Calibri" panose="020F0502020204030204" pitchFamily="34" charset="0"/>
+              <a:ea typeface="Calibri" panose="020F0502020204030204" pitchFamily="34" charset="0"/>
+              <a:cs typeface="Times New Roman" panose="02020603050405020304" pitchFamily="18" charset="0"/>
+            </a:endParaRPr>
+          </a:p>
+          <a:p>
+            <a:pPr marL="0" marR="0" lvl="0" indent="0" algn="l" defTabSz="914400" rtl="0" eaLnBrk="1" fontAlgn="auto" latinLnBrk="0" hangingPunct="1">
+              <a:lnSpc>
+                <a:spcPct val="100000"/>
+              </a:lnSpc>
+              <a:spcBef>
+                <a:spcPts val="0"/>
+              </a:spcBef>
+              <a:spcAft>
+                <a:spcPts val="0"/>
+              </a:spcAft>
+              <a:buClrTx/>
+              <a:buSzTx/>
+              <a:buFontTx/>
+              <a:buNone/>
+              <a:tabLst/>
+              <a:defRPr/>
+            </a:pPr>
+            <a:r>
+              <a:rPr lang="en-GB" sz="1800" dirty="0">
+                <a:effectLst/>
+                <a:latin typeface="Calibri" panose="020F0502020204030204" pitchFamily="34" charset="0"/>
+                <a:ea typeface="Calibri" panose="020F0502020204030204" pitchFamily="34" charset="0"/>
+                <a:cs typeface="Times New Roman" panose="02020603050405020304" pitchFamily="18" charset="0"/>
+              </a:rPr>
+              <a:t>Personal:</a:t>
+            </a:r>
+          </a:p>
+          <a:p>
+            <a:pPr marL="0" marR="0" lvl="0" indent="0" algn="l" defTabSz="914400" rtl="0" eaLnBrk="1" fontAlgn="auto" latinLnBrk="0" hangingPunct="1">
+              <a:lnSpc>
+                <a:spcPct val="100000"/>
+              </a:lnSpc>
+              <a:spcBef>
+                <a:spcPts val="0"/>
+              </a:spcBef>
+              <a:spcAft>
+                <a:spcPts val="0"/>
+              </a:spcAft>
+              <a:buClrTx/>
+              <a:buSzTx/>
+              <a:buFontTx/>
+              <a:buNone/>
+              <a:tabLst/>
+              <a:defRPr/>
+            </a:pPr>
+            <a:r>
+              <a:rPr lang="en-GB" sz="1800" dirty="0">
+                <a:effectLst/>
+                <a:latin typeface="Calibri" panose="020F0502020204030204" pitchFamily="34" charset="0"/>
+                <a:ea typeface="Calibri" panose="020F0502020204030204" pitchFamily="34" charset="0"/>
+                <a:cs typeface="Times New Roman" panose="02020603050405020304" pitchFamily="18" charset="0"/>
+              </a:rPr>
+              <a:t>I have always been interested in maths as well as </a:t>
+            </a:r>
+            <a:r>
+              <a:rPr lang="en-GB" sz="1800" dirty="0" err="1">
+                <a:effectLst/>
+                <a:latin typeface="Calibri" panose="020F0502020204030204" pitchFamily="34" charset="0"/>
+                <a:ea typeface="Calibri" panose="020F0502020204030204" pitchFamily="34" charset="0"/>
+                <a:cs typeface="Times New Roman" panose="02020603050405020304" pitchFamily="18" charset="0"/>
+              </a:rPr>
+              <a:t>compsci</a:t>
+            </a:r>
+            <a:r>
+              <a:rPr lang="en-GB" sz="1800" dirty="0">
+                <a:effectLst/>
+                <a:latin typeface="Calibri" panose="020F0502020204030204" pitchFamily="34" charset="0"/>
+                <a:ea typeface="Calibri" panose="020F0502020204030204" pitchFamily="34" charset="0"/>
+                <a:cs typeface="Times New Roman" panose="02020603050405020304" pitchFamily="18" charset="0"/>
+              </a:rPr>
+              <a:t>, this project allows me to link the two together </a:t>
+            </a:r>
+          </a:p>
+          <a:p>
+            <a:endParaRPr lang="en-GB" sz="1800" dirty="0">
+              <a:effectLst/>
+              <a:latin typeface="Calibri" panose="020F0502020204030204" pitchFamily="34" charset="0"/>
+              <a:ea typeface="Calibri" panose="020F0502020204030204" pitchFamily="34" charset="0"/>
+              <a:cs typeface="Times New Roman" panose="02020603050405020304" pitchFamily="18" charset="0"/>
+            </a:endParaRPr>
           </a:p>
           <a:p>
             <a:endParaRPr lang="en-GB" dirty="0"/>
@@ -638,6 +937,268 @@
     <p:extLst>
       <p:ext uri="{BB962C8B-B14F-4D97-AF65-F5344CB8AC3E}">
         <p14:creationId xmlns:p14="http://schemas.microsoft.com/office/powerpoint/2010/main" val="3000241157"/>
+      </p:ext>
+    </p:extLst>
+  </p:cSld>
+  <p:clrMapOvr>
+    <a:masterClrMapping/>
+  </p:clrMapOvr>
+</p:notes>
+</file>
+
+<file path=ppt/notesSlides/notesSlide2.xml><?xml version="1.0" encoding="utf-8"?>
+<p:notes xmlns:a="http://schemas.openxmlformats.org/drawingml/2006/main" xmlns:r="http://schemas.openxmlformats.org/officeDocument/2006/relationships" xmlns:p="http://schemas.openxmlformats.org/presentationml/2006/main">
+  <p:cSld>
+    <p:spTree>
+      <p:nvGrpSpPr>
+        <p:cNvPr id="1" name=""/>
+        <p:cNvGrpSpPr/>
+        <p:nvPr/>
+      </p:nvGrpSpPr>
+      <p:grpSpPr>
+        <a:xfrm>
+          <a:off x="0" y="0"/>
+          <a:ext cx="0" cy="0"/>
+          <a:chOff x="0" y="0"/>
+          <a:chExt cx="0" cy="0"/>
+        </a:xfrm>
+      </p:grpSpPr>
+      <p:sp>
+        <p:nvSpPr>
+          <p:cNvPr id="2" name="Slide Image Placeholder 1"/>
+          <p:cNvSpPr>
+            <a:spLocks noGrp="1" noRot="1" noChangeAspect="1"/>
+          </p:cNvSpPr>
+          <p:nvPr>
+            <p:ph type="sldImg"/>
+          </p:nvPr>
+        </p:nvSpPr>
+        <p:spPr/>
+      </p:sp>
+      <p:sp>
+        <p:nvSpPr>
+          <p:cNvPr id="3" name="Notes Placeholder 2"/>
+          <p:cNvSpPr>
+            <a:spLocks noGrp="1"/>
+          </p:cNvSpPr>
+          <p:nvPr>
+            <p:ph type="body" idx="1"/>
+          </p:nvPr>
+        </p:nvSpPr>
+        <p:spPr/>
+        <p:txBody>
+          <a:bodyPr/>
+          <a:lstStyle/>
+          <a:p>
+            <a:r>
+              <a:rPr lang="en-GB" dirty="0"/>
+              <a:t>The content remains the same however as seen the layout is different but the core content remains the same</a:t>
+            </a:r>
+          </a:p>
+        </p:txBody>
+      </p:sp>
+      <p:sp>
+        <p:nvSpPr>
+          <p:cNvPr id="4" name="Slide Number Placeholder 3"/>
+          <p:cNvSpPr>
+            <a:spLocks noGrp="1"/>
+          </p:cNvSpPr>
+          <p:nvPr>
+            <p:ph type="sldNum" sz="quarter" idx="5"/>
+          </p:nvPr>
+        </p:nvSpPr>
+        <p:spPr/>
+        <p:txBody>
+          <a:bodyPr/>
+          <a:lstStyle/>
+          <a:p>
+            <a:fld id="{88962D39-8558-4577-86DE-E3A243CACEE9}" type="slidenum">
+              <a:rPr lang="en-GB" smtClean="0"/>
+              <a:t>3</a:t>
+            </a:fld>
+            <a:endParaRPr lang="en-GB" dirty="0"/>
+          </a:p>
+        </p:txBody>
+      </p:sp>
+    </p:spTree>
+    <p:extLst>
+      <p:ext uri="{BB962C8B-B14F-4D97-AF65-F5344CB8AC3E}">
+        <p14:creationId xmlns:p14="http://schemas.microsoft.com/office/powerpoint/2010/main" val="1250751068"/>
+      </p:ext>
+    </p:extLst>
+  </p:cSld>
+  <p:clrMapOvr>
+    <a:masterClrMapping/>
+  </p:clrMapOvr>
+</p:notes>
+</file>
+
+<file path=ppt/notesSlides/notesSlide3.xml><?xml version="1.0" encoding="utf-8"?>
+<p:notes xmlns:a="http://schemas.openxmlformats.org/drawingml/2006/main" xmlns:r="http://schemas.openxmlformats.org/officeDocument/2006/relationships" xmlns:p="http://schemas.openxmlformats.org/presentationml/2006/main">
+  <p:cSld>
+    <p:spTree>
+      <p:nvGrpSpPr>
+        <p:cNvPr id="1" name=""/>
+        <p:cNvGrpSpPr/>
+        <p:nvPr/>
+      </p:nvGrpSpPr>
+      <p:grpSpPr>
+        <a:xfrm>
+          <a:off x="0" y="0"/>
+          <a:ext cx="0" cy="0"/>
+          <a:chOff x="0" y="0"/>
+          <a:chExt cx="0" cy="0"/>
+        </a:xfrm>
+      </p:grpSpPr>
+      <p:sp>
+        <p:nvSpPr>
+          <p:cNvPr id="2" name="Slide Image Placeholder 1"/>
+          <p:cNvSpPr>
+            <a:spLocks noGrp="1" noRot="1" noChangeAspect="1"/>
+          </p:cNvSpPr>
+          <p:nvPr>
+            <p:ph type="sldImg"/>
+          </p:nvPr>
+        </p:nvSpPr>
+        <p:spPr/>
+      </p:sp>
+      <p:sp>
+        <p:nvSpPr>
+          <p:cNvPr id="3" name="Notes Placeholder 2"/>
+          <p:cNvSpPr>
+            <a:spLocks noGrp="1"/>
+          </p:cNvSpPr>
+          <p:nvPr>
+            <p:ph type="body" idx="1"/>
+          </p:nvPr>
+        </p:nvSpPr>
+        <p:spPr/>
+        <p:txBody>
+          <a:bodyPr/>
+          <a:lstStyle/>
+          <a:p>
+            <a:r>
+              <a:rPr lang="en-GB" dirty="0"/>
+              <a:t>Here is a table that shows the key features and what I have achieved so far and what I have left to implement</a:t>
+            </a:r>
+          </a:p>
+        </p:txBody>
+      </p:sp>
+      <p:sp>
+        <p:nvSpPr>
+          <p:cNvPr id="4" name="Slide Number Placeholder 3"/>
+          <p:cNvSpPr>
+            <a:spLocks noGrp="1"/>
+          </p:cNvSpPr>
+          <p:nvPr>
+            <p:ph type="sldNum" sz="quarter" idx="5"/>
+          </p:nvPr>
+        </p:nvSpPr>
+        <p:spPr/>
+        <p:txBody>
+          <a:bodyPr/>
+          <a:lstStyle/>
+          <a:p>
+            <a:fld id="{88962D39-8558-4577-86DE-E3A243CACEE9}" type="slidenum">
+              <a:rPr lang="en-GB" smtClean="0"/>
+              <a:t>4</a:t>
+            </a:fld>
+            <a:endParaRPr lang="en-GB" dirty="0"/>
+          </a:p>
+        </p:txBody>
+      </p:sp>
+    </p:spTree>
+    <p:extLst>
+      <p:ext uri="{BB962C8B-B14F-4D97-AF65-F5344CB8AC3E}">
+        <p14:creationId xmlns:p14="http://schemas.microsoft.com/office/powerpoint/2010/main" val="2866285171"/>
+      </p:ext>
+    </p:extLst>
+  </p:cSld>
+  <p:clrMapOvr>
+    <a:masterClrMapping/>
+  </p:clrMapOvr>
+</p:notes>
+</file>
+
+<file path=ppt/notesSlides/notesSlide4.xml><?xml version="1.0" encoding="utf-8"?>
+<p:notes xmlns:a="http://schemas.openxmlformats.org/drawingml/2006/main" xmlns:r="http://schemas.openxmlformats.org/officeDocument/2006/relationships" xmlns:p="http://schemas.openxmlformats.org/presentationml/2006/main">
+  <p:cSld>
+    <p:spTree>
+      <p:nvGrpSpPr>
+        <p:cNvPr id="1" name=""/>
+        <p:cNvGrpSpPr/>
+        <p:nvPr/>
+      </p:nvGrpSpPr>
+      <p:grpSpPr>
+        <a:xfrm>
+          <a:off x="0" y="0"/>
+          <a:ext cx="0" cy="0"/>
+          <a:chOff x="0" y="0"/>
+          <a:chExt cx="0" cy="0"/>
+        </a:xfrm>
+      </p:grpSpPr>
+      <p:sp>
+        <p:nvSpPr>
+          <p:cNvPr id="2" name="Slide Image Placeholder 1"/>
+          <p:cNvSpPr>
+            <a:spLocks noGrp="1" noRot="1" noChangeAspect="1"/>
+          </p:cNvSpPr>
+          <p:nvPr>
+            <p:ph type="sldImg"/>
+          </p:nvPr>
+        </p:nvSpPr>
+        <p:spPr/>
+      </p:sp>
+      <p:sp>
+        <p:nvSpPr>
+          <p:cNvPr id="3" name="Notes Placeholder 2"/>
+          <p:cNvSpPr>
+            <a:spLocks noGrp="1"/>
+          </p:cNvSpPr>
+          <p:nvPr>
+            <p:ph type="body" idx="1"/>
+          </p:nvPr>
+        </p:nvSpPr>
+        <p:spPr/>
+        <p:txBody>
+          <a:bodyPr/>
+          <a:lstStyle/>
+          <a:p>
+            <a:r>
+              <a:rPr lang="en-GB" dirty="0" err="1"/>
+              <a:t>Equa</a:t>
+            </a:r>
+            <a:endParaRPr lang="en-GB" dirty="0"/>
+          </a:p>
+        </p:txBody>
+      </p:sp>
+      <p:sp>
+        <p:nvSpPr>
+          <p:cNvPr id="4" name="Slide Number Placeholder 3"/>
+          <p:cNvSpPr>
+            <a:spLocks noGrp="1"/>
+          </p:cNvSpPr>
+          <p:nvPr>
+            <p:ph type="sldNum" sz="quarter" idx="5"/>
+          </p:nvPr>
+        </p:nvSpPr>
+        <p:spPr/>
+        <p:txBody>
+          <a:bodyPr/>
+          <a:lstStyle/>
+          <a:p>
+            <a:fld id="{88962D39-8558-4577-86DE-E3A243CACEE9}" type="slidenum">
+              <a:rPr lang="en-GB" smtClean="0"/>
+              <a:t>5</a:t>
+            </a:fld>
+            <a:endParaRPr lang="en-GB"/>
+          </a:p>
+        </p:txBody>
+      </p:sp>
+    </p:spTree>
+    <p:extLst>
+      <p:ext uri="{BB962C8B-B14F-4D97-AF65-F5344CB8AC3E}">
+        <p14:creationId xmlns:p14="http://schemas.microsoft.com/office/powerpoint/2010/main" val="1428078070"/>
       </p:ext>
     </p:extLst>
   </p:cSld>
@@ -3868,6 +4429,14 @@
 <file path=ppt/slides/slide1.xml><?xml version="1.0" encoding="utf-8"?>
 <p:sld xmlns:a="http://schemas.openxmlformats.org/drawingml/2006/main" xmlns:r="http://schemas.openxmlformats.org/officeDocument/2006/relationships" xmlns:p="http://schemas.openxmlformats.org/presentationml/2006/main">
   <p:cSld>
+    <p:bg>
+      <p:bgPr>
+        <a:solidFill>
+          <a:schemeClr val="bg1"/>
+        </a:solidFill>
+        <a:effectLst/>
+      </p:bgPr>
+    </p:bg>
     <p:spTree>
       <p:nvGrpSpPr>
         <p:cNvPr id="1" name=""/>
@@ -3988,6 +4557,53 @@
           </a:p>
         </p:txBody>
       </p:sp>
+      <p:pic>
+        <p:nvPicPr>
+          <p:cNvPr id="1028" name="Picture 4" descr="University of Liverpool Crest transparent PNG - StickPNG">
+            <a:extLst>
+              <a:ext uri="{FF2B5EF4-FFF2-40B4-BE49-F238E27FC236}">
+                <a16:creationId xmlns:a16="http://schemas.microsoft.com/office/drawing/2014/main" id="{82B8D5D5-BA2A-02D6-24FC-CBE776D62172}"/>
+              </a:ext>
+            </a:extLst>
+          </p:cNvPr>
+          <p:cNvPicPr>
+            <a:picLocks noChangeAspect="1" noChangeArrowheads="1"/>
+          </p:cNvPicPr>
+          <p:nvPr/>
+        </p:nvPicPr>
+        <p:blipFill>
+          <a:blip r:embed="rId2">
+            <a:extLst>
+              <a:ext uri="{28A0092B-C50C-407E-A947-70E740481C1C}">
+                <a14:useLocalDpi xmlns:a14="http://schemas.microsoft.com/office/drawing/2010/main" val="0"/>
+              </a:ext>
+            </a:extLst>
+          </a:blip>
+          <a:srcRect/>
+          <a:stretch>
+            <a:fillRect/>
+          </a:stretch>
+        </p:blipFill>
+        <p:spPr bwMode="auto">
+          <a:xfrm>
+            <a:off x="115554" y="50800"/>
+            <a:ext cx="2143125" cy="2143125"/>
+          </a:xfrm>
+          <a:prstGeom prst="rect">
+            <a:avLst/>
+          </a:prstGeom>
+          <a:noFill/>
+          <a:extLst>
+            <a:ext uri="{909E8E84-426E-40DD-AFC4-6F175D3DCCD1}">
+              <a14:hiddenFill xmlns:a14="http://schemas.microsoft.com/office/drawing/2010/main">
+                <a:solidFill>
+                  <a:srgbClr val="FFFFFF"/>
+                </a:solidFill>
+              </a14:hiddenFill>
+            </a:ext>
+          </a:extLst>
+        </p:spPr>
+      </p:pic>
     </p:spTree>
     <p:extLst>
       <p:ext uri="{BB962C8B-B14F-4D97-AF65-F5344CB8AC3E}">
@@ -4081,6 +4697,9 @@
           <a:p>
             <a:endParaRPr lang="en-GB" dirty="0"/>
           </a:p>
+          <a:p>
+            <a:endParaRPr lang="en-GB" dirty="0"/>
+          </a:p>
         </p:txBody>
       </p:sp>
     </p:spTree>
@@ -4093,13 +4712,13 @@
   <p:clrMapOvr>
     <a:masterClrMapping/>
   </p:clrMapOvr>
-  <mc:AlternateContent xmlns:mc="http://schemas.openxmlformats.org/markup-compatibility/2006">
-    <mc:Choice xmlns:p14="http://schemas.microsoft.com/office/powerpoint/2010/main" Requires="p14">
+  <mc:AlternateContent xmlns:mc="http://schemas.openxmlformats.org/markup-compatibility/2006" xmlns:p14="http://schemas.microsoft.com/office/powerpoint/2010/main">
+    <mc:Choice Requires="p14">
       <p:transition spd="med" p14:dur="700">
         <p:fade/>
       </p:transition>
     </mc:Choice>
-    <mc:Fallback>
+    <mc:Fallback xmlns="">
       <p:transition spd="med">
         <p:fade/>
       </p:transition>
@@ -4153,31 +4772,102 @@
           </a:p>
         </p:txBody>
       </p:sp>
-      <p:sp>
-        <p:nvSpPr>
-          <p:cNvPr id="3" name="Content Placeholder 2">
-            <a:extLst>
-              <a:ext uri="{FF2B5EF4-FFF2-40B4-BE49-F238E27FC236}">
-                <a16:creationId xmlns:a16="http://schemas.microsoft.com/office/drawing/2014/main" id="{0A034CED-40A1-5875-6E1D-46C489EE8D53}"/>
-              </a:ext>
-            </a:extLst>
-          </p:cNvPr>
-          <p:cNvSpPr>
-            <a:spLocks noGrp="1"/>
-          </p:cNvSpPr>
-          <p:nvPr>
-            <p:ph idx="1"/>
-          </p:nvPr>
-        </p:nvSpPr>
-        <p:spPr/>
-        <p:txBody>
-          <a:bodyPr/>
-          <a:lstStyle/>
-          <a:p>
-            <a:endParaRPr lang="en-GB" dirty="0"/>
-          </a:p>
-        </p:txBody>
-      </p:sp>
+      <p:pic>
+        <p:nvPicPr>
+          <p:cNvPr id="7" name="Picture 6">
+            <a:extLst>
+              <a:ext uri="{FF2B5EF4-FFF2-40B4-BE49-F238E27FC236}">
+                <a16:creationId xmlns:a16="http://schemas.microsoft.com/office/drawing/2014/main" id="{B1E555B1-E8E5-D75F-DBD8-9A04F0EA172F}"/>
+              </a:ext>
+            </a:extLst>
+          </p:cNvPr>
+          <p:cNvPicPr>
+            <a:picLocks noChangeAspect="1"/>
+          </p:cNvPicPr>
+          <p:nvPr/>
+        </p:nvPicPr>
+        <p:blipFill>
+          <a:blip r:embed="rId3"/>
+          <a:stretch>
+            <a:fillRect/>
+          </a:stretch>
+        </p:blipFill>
+        <p:spPr>
+          <a:xfrm>
+            <a:off x="6794205" y="1542321"/>
+            <a:ext cx="5397795" cy="5315679"/>
+          </a:xfrm>
+          <a:prstGeom prst="rect">
+            <a:avLst/>
+          </a:prstGeom>
+        </p:spPr>
+      </p:pic>
+      <p:pic>
+        <p:nvPicPr>
+          <p:cNvPr id="9" name="Picture 8" descr="A close-up of a drawing&#10;&#10;AI-generated content may be incorrect.">
+            <a:extLst>
+              <a:ext uri="{FF2B5EF4-FFF2-40B4-BE49-F238E27FC236}">
+                <a16:creationId xmlns:a16="http://schemas.microsoft.com/office/drawing/2014/main" id="{BA00F632-F59D-9312-BD19-D7055310E7BF}"/>
+              </a:ext>
+            </a:extLst>
+          </p:cNvPr>
+          <p:cNvPicPr>
+            <a:picLocks noChangeAspect="1"/>
+          </p:cNvPicPr>
+          <p:nvPr/>
+        </p:nvPicPr>
+        <p:blipFill>
+          <a:blip r:embed="rId4">
+            <a:extLst>
+              <a:ext uri="{28A0092B-C50C-407E-A947-70E740481C1C}">
+                <a14:useLocalDpi xmlns:a14="http://schemas.microsoft.com/office/drawing/2010/main" val="0"/>
+              </a:ext>
+            </a:extLst>
+          </a:blip>
+          <a:stretch>
+            <a:fillRect/>
+          </a:stretch>
+        </p:blipFill>
+        <p:spPr>
+          <a:xfrm>
+            <a:off x="1360438" y="1542321"/>
+            <a:ext cx="3346821" cy="5167312"/>
+          </a:xfrm>
+          <a:prstGeom prst="rect">
+            <a:avLst/>
+          </a:prstGeom>
+          <a:solidFill>
+            <a:srgbClr val="FFFFFF">
+              <a:shade val="85000"/>
+            </a:srgbClr>
+          </a:solidFill>
+          <a:ln w="88900" cap="sq">
+            <a:solidFill>
+              <a:srgbClr val="FFFFFF"/>
+            </a:solidFill>
+            <a:miter lim="800000"/>
+          </a:ln>
+          <a:effectLst>
+            <a:outerShdw blurRad="55000" dist="18000" dir="5400000" algn="tl" rotWithShape="0">
+              <a:srgbClr val="000000">
+                <a:alpha val="40000"/>
+              </a:srgbClr>
+            </a:outerShdw>
+          </a:effectLst>
+          <a:scene3d>
+            <a:camera prst="orthographicFront"/>
+            <a:lightRig rig="twoPt" dir="t">
+              <a:rot lat="0" lon="0" rev="7200000"/>
+            </a:lightRig>
+          </a:scene3d>
+          <a:sp3d>
+            <a:bevelT w="25400" h="19050"/>
+            <a:contourClr>
+              <a:srgbClr val="FFFFFF"/>
+            </a:contourClr>
+          </a:sp3d>
+        </p:spPr>
+      </p:pic>
     </p:spTree>
     <p:extLst>
       <p:ext uri="{BB962C8B-B14F-4D97-AF65-F5344CB8AC3E}">
@@ -4224,14 +4914,19 @@
             <p:ph type="title"/>
           </p:nvPr>
         </p:nvSpPr>
-        <p:spPr/>
+        <p:spPr>
+          <a:xfrm>
+            <a:off x="838200" y="184371"/>
+            <a:ext cx="10515600" cy="1325563"/>
+          </a:xfrm>
+        </p:spPr>
         <p:txBody>
           <a:bodyPr/>
           <a:lstStyle/>
           <a:p>
             <a:r>
               <a:rPr lang="en-GB" dirty="0"/>
-              <a:t>Features</a:t>
+              <a:t>Key Features</a:t>
             </a:r>
           </a:p>
         </p:txBody>
@@ -4251,14 +4946,14 @@
           <p:nvPr>
             <p:extLst>
               <p:ext uri="{D42A27DB-BD31-4B8C-83A1-F6EECF244321}">
-                <p14:modId xmlns:p14="http://schemas.microsoft.com/office/powerpoint/2010/main" val="2781994289"/>
+                <p14:modId xmlns:p14="http://schemas.microsoft.com/office/powerpoint/2010/main" val="1598835709"/>
               </p:ext>
             </p:extLst>
           </p:nvPr>
         </p:nvGraphicFramePr>
         <p:xfrm>
-          <a:off x="2032000" y="1938866"/>
-          <a:ext cx="8127999" cy="3708400"/>
+          <a:off x="1834707" y="1085577"/>
+          <a:ext cx="8522586" cy="5401583"/>
         </p:xfrm>
         <a:graphic>
           <a:graphicData uri="http://schemas.openxmlformats.org/drawingml/2006/table">
@@ -4267,21 +4962,21 @@
                 <a:tableStyleId>{5C22544A-7EE6-4342-B048-85BDC9FD1C3A}</a:tableStyleId>
               </a:tblPr>
               <a:tblGrid>
-                <a:gridCol w="2709333">
+                <a:gridCol w="2840862">
                   <a:extLst>
                     <a:ext uri="{9D8B030D-6E8A-4147-A177-3AD203B41FA5}">
                       <a16:colId xmlns:a16="http://schemas.microsoft.com/office/drawing/2014/main" val="3229649101"/>
                     </a:ext>
                   </a:extLst>
                 </a:gridCol>
-                <a:gridCol w="2709333">
+                <a:gridCol w="2840862">
                   <a:extLst>
                     <a:ext uri="{9D8B030D-6E8A-4147-A177-3AD203B41FA5}">
                       <a16:colId xmlns:a16="http://schemas.microsoft.com/office/drawing/2014/main" val="1371222870"/>
                     </a:ext>
                   </a:extLst>
                 </a:gridCol>
-                <a:gridCol w="2709333">
+                <a:gridCol w="2840862">
                   <a:extLst>
                     <a:ext uri="{9D8B030D-6E8A-4147-A177-3AD203B41FA5}">
                       <a16:colId xmlns:a16="http://schemas.microsoft.com/office/drawing/2014/main" val="3630822842"/>
@@ -4341,7 +5036,10 @@
                     <a:bodyPr/>
                     <a:lstStyle/>
                     <a:p>
-                      <a:endParaRPr lang="en-GB" dirty="0"/>
+                      <a:r>
+                        <a:rPr lang="en-GB" dirty="0"/>
+                        <a:t>Solves arithmetic</a:t>
+                      </a:r>
                     </a:p>
                   </a:txBody>
                   <a:tcPr/>
@@ -4351,7 +5049,10 @@
                     <a:bodyPr/>
                     <a:lstStyle/>
                     <a:p>
-                      <a:endParaRPr lang="en-GB"/>
+                      <a:r>
+                        <a:rPr lang="en-GB" dirty="0"/>
+                        <a:t>✅</a:t>
+                      </a:r>
                     </a:p>
                   </a:txBody>
                   <a:tcPr/>
@@ -4361,7 +5062,10 @@
                     <a:bodyPr/>
                     <a:lstStyle/>
                     <a:p>
-                      <a:endParaRPr lang="en-GB"/>
+                      <a:r>
+                        <a:rPr lang="en-GB" dirty="0"/>
+                        <a:t>Works perfect</a:t>
+                      </a:r>
                     </a:p>
                   </a:txBody>
                   <a:tcPr/>
@@ -4378,7 +5082,10 @@
                     <a:bodyPr/>
                     <a:lstStyle/>
                     <a:p>
-                      <a:endParaRPr lang="en-GB"/>
+                      <a:r>
+                        <a:rPr lang="en-GB" dirty="0"/>
+                        <a:t>Solves Linear</a:t>
+                      </a:r>
                     </a:p>
                   </a:txBody>
                   <a:tcPr/>
@@ -4388,7 +5095,10 @@
                     <a:bodyPr/>
                     <a:lstStyle/>
                     <a:p>
-                      <a:endParaRPr lang="en-GB"/>
+                      <a:r>
+                        <a:rPr lang="en-GB" dirty="0"/>
+                        <a:t>✅</a:t>
+                      </a:r>
                     </a:p>
                   </a:txBody>
                   <a:tcPr/>
@@ -4398,7 +5108,10 @@
                     <a:bodyPr/>
                     <a:lstStyle/>
                     <a:p>
-                      <a:endParaRPr lang="en-GB"/>
+                      <a:r>
+                        <a:rPr lang="en-GB" dirty="0"/>
+                        <a:t>Works perfect</a:t>
+                      </a:r>
                     </a:p>
                   </a:txBody>
                   <a:tcPr/>
@@ -4415,7 +5128,10 @@
                     <a:bodyPr/>
                     <a:lstStyle/>
                     <a:p>
-                      <a:endParaRPr lang="en-GB"/>
+                      <a:r>
+                        <a:rPr lang="en-GB" dirty="0"/>
+                        <a:t>Solves System of linear</a:t>
+                      </a:r>
                     </a:p>
                   </a:txBody>
                   <a:tcPr/>
@@ -4425,7 +5141,10 @@
                     <a:bodyPr/>
                     <a:lstStyle/>
                     <a:p>
-                      <a:endParaRPr lang="en-GB"/>
+                      <a:r>
+                        <a:rPr lang="en-GB" dirty="0"/>
+                        <a:t>✅</a:t>
+                      </a:r>
                     </a:p>
                   </a:txBody>
                   <a:tcPr/>
@@ -4435,7 +5154,10 @@
                     <a:bodyPr/>
                     <a:lstStyle/>
                     <a:p>
-                      <a:endParaRPr lang="en-GB"/>
+                      <a:r>
+                        <a:rPr lang="en-GB" dirty="0"/>
+                        <a:t>Works perfect</a:t>
+                      </a:r>
                     </a:p>
                   </a:txBody>
                   <a:tcPr/>
@@ -4452,7 +5174,10 @@
                     <a:bodyPr/>
                     <a:lstStyle/>
                     <a:p>
-                      <a:endParaRPr lang="en-GB"/>
+                      <a:r>
+                        <a:rPr lang="en-GB" dirty="0"/>
+                        <a:t>Solves nonlinear</a:t>
+                      </a:r>
                     </a:p>
                   </a:txBody>
                   <a:tcPr/>
@@ -4462,7 +5187,10 @@
                     <a:bodyPr/>
                     <a:lstStyle/>
                     <a:p>
-                      <a:endParaRPr lang="en-GB"/>
+                      <a:r>
+                        <a:rPr lang="en-GB" dirty="0"/>
+                        <a:t>❌</a:t>
+                      </a:r>
                     </a:p>
                   </a:txBody>
                   <a:tcPr/>
@@ -4472,7 +5200,10 @@
                     <a:bodyPr/>
                     <a:lstStyle/>
                     <a:p>
-                      <a:endParaRPr lang="en-GB"/>
+                      <a:r>
+                        <a:rPr lang="en-GB" dirty="0"/>
+                        <a:t>Implement</a:t>
+                      </a:r>
                     </a:p>
                   </a:txBody>
                   <a:tcPr/>
@@ -4489,7 +5220,10 @@
                     <a:bodyPr/>
                     <a:lstStyle/>
                     <a:p>
-                      <a:endParaRPr lang="en-GB"/>
+                      <a:r>
+                        <a:rPr lang="en-GB" dirty="0"/>
+                        <a:t>Solves inequalities</a:t>
+                      </a:r>
                     </a:p>
                   </a:txBody>
                   <a:tcPr/>
@@ -4499,7 +5233,10 @@
                     <a:bodyPr/>
                     <a:lstStyle/>
                     <a:p>
-                      <a:endParaRPr lang="en-GB"/>
+                      <a:r>
+                        <a:rPr lang="en-GB" dirty="0"/>
+                        <a:t>❌</a:t>
+                      </a:r>
                     </a:p>
                   </a:txBody>
                   <a:tcPr/>
@@ -4509,7 +5246,10 @@
                     <a:bodyPr/>
                     <a:lstStyle/>
                     <a:p>
-                      <a:endParaRPr lang="en-GB"/>
+                      <a:r>
+                        <a:rPr lang="en-GB" dirty="0"/>
+                        <a:t>Implement</a:t>
+                      </a:r>
                     </a:p>
                   </a:txBody>
                   <a:tcPr/>
@@ -4526,7 +5266,10 @@
                     <a:bodyPr/>
                     <a:lstStyle/>
                     <a:p>
-                      <a:endParaRPr lang="en-GB"/>
+                      <a:r>
+                        <a:rPr lang="en-GB" dirty="0"/>
+                        <a:t>Solves Quadratics</a:t>
+                      </a:r>
                     </a:p>
                   </a:txBody>
                   <a:tcPr/>
@@ -4536,7 +5279,27 @@
                     <a:bodyPr/>
                     <a:lstStyle/>
                     <a:p>
-                      <a:endParaRPr lang="en-GB"/>
+                      <a:pPr marL="0" marR="0" lvl="0" indent="0" algn="l" defTabSz="914400" rtl="0" eaLnBrk="1" fontAlgn="auto" latinLnBrk="0" hangingPunct="1">
+                        <a:lnSpc>
+                          <a:spcPct val="100000"/>
+                        </a:lnSpc>
+                        <a:spcBef>
+                          <a:spcPts val="0"/>
+                        </a:spcBef>
+                        <a:spcAft>
+                          <a:spcPts val="0"/>
+                        </a:spcAft>
+                        <a:buClrTx/>
+                        <a:buSzTx/>
+                        <a:buFontTx/>
+                        <a:buNone/>
+                        <a:tabLst/>
+                        <a:defRPr/>
+                      </a:pPr>
+                      <a:r>
+                        <a:rPr lang="en-GB" dirty="0"/>
+                        <a:t>✅</a:t>
+                      </a:r>
                     </a:p>
                   </a:txBody>
                   <a:tcPr/>
@@ -4546,7 +5309,10 @@
                     <a:bodyPr/>
                     <a:lstStyle/>
                     <a:p>
-                      <a:endParaRPr lang="en-GB"/>
+                      <a:r>
+                        <a:rPr lang="en-GB" dirty="0"/>
+                        <a:t>Works perfect </a:t>
+                      </a:r>
                     </a:p>
                   </a:txBody>
                   <a:tcPr/>
@@ -4557,13 +5323,16 @@
                   </a:ext>
                 </a:extLst>
               </a:tr>
-              <a:tr h="370840">
+              <a:tr h="413023">
                 <a:tc>
                   <a:txBody>
                     <a:bodyPr/>
                     <a:lstStyle/>
                     <a:p>
-                      <a:endParaRPr lang="en-GB"/>
+                      <a:r>
+                        <a:rPr lang="en-GB" dirty="0"/>
+                        <a:t>Frontend for input/output</a:t>
+                      </a:r>
                     </a:p>
                   </a:txBody>
                   <a:tcPr/>
@@ -4573,7 +5342,27 @@
                     <a:bodyPr/>
                     <a:lstStyle/>
                     <a:p>
-                      <a:endParaRPr lang="en-GB"/>
+                      <a:pPr marL="0" marR="0" lvl="0" indent="0" algn="l" defTabSz="914400" rtl="0" eaLnBrk="1" fontAlgn="auto" latinLnBrk="0" hangingPunct="1">
+                        <a:lnSpc>
+                          <a:spcPct val="100000"/>
+                        </a:lnSpc>
+                        <a:spcBef>
+                          <a:spcPts val="0"/>
+                        </a:spcBef>
+                        <a:spcAft>
+                          <a:spcPts val="0"/>
+                        </a:spcAft>
+                        <a:buClrTx/>
+                        <a:buSzTx/>
+                        <a:buFontTx/>
+                        <a:buNone/>
+                        <a:tabLst/>
+                        <a:defRPr/>
+                      </a:pPr>
+                      <a:r>
+                        <a:rPr lang="en-GB" dirty="0"/>
+                        <a:t>✅</a:t>
+                      </a:r>
                     </a:p>
                   </a:txBody>
                   <a:tcPr/>
@@ -4583,7 +5372,10 @@
                     <a:bodyPr/>
                     <a:lstStyle/>
                     <a:p>
-                      <a:endParaRPr lang="en-GB"/>
+                      <a:r>
+                        <a:rPr lang="en-GB" dirty="0"/>
+                        <a:t>Make more interactive</a:t>
+                      </a:r>
                     </a:p>
                   </a:txBody>
                   <a:tcPr/>
@@ -4600,7 +5392,10 @@
                     <a:bodyPr/>
                     <a:lstStyle/>
                     <a:p>
-                      <a:endParaRPr lang="en-GB"/>
+                      <a:r>
+                        <a:rPr lang="en-GB" dirty="0"/>
+                        <a:t>Graph for equations</a:t>
+                      </a:r>
                     </a:p>
                   </a:txBody>
                   <a:tcPr/>
@@ -4610,7 +5405,27 @@
                     <a:bodyPr/>
                     <a:lstStyle/>
                     <a:p>
-                      <a:endParaRPr lang="en-GB"/>
+                      <a:pPr marL="0" marR="0" lvl="0" indent="0" algn="l" defTabSz="914400" rtl="0" eaLnBrk="1" fontAlgn="auto" latinLnBrk="0" hangingPunct="1">
+                        <a:lnSpc>
+                          <a:spcPct val="100000"/>
+                        </a:lnSpc>
+                        <a:spcBef>
+                          <a:spcPts val="0"/>
+                        </a:spcBef>
+                        <a:spcAft>
+                          <a:spcPts val="0"/>
+                        </a:spcAft>
+                        <a:buClrTx/>
+                        <a:buSzTx/>
+                        <a:buFontTx/>
+                        <a:buNone/>
+                        <a:tabLst/>
+                        <a:defRPr/>
+                      </a:pPr>
+                      <a:r>
+                        <a:rPr lang="en-GB" dirty="0"/>
+                        <a:t>✅</a:t>
+                      </a:r>
                     </a:p>
                   </a:txBody>
                   <a:tcPr/>
@@ -4620,7 +5435,10 @@
                     <a:bodyPr/>
                     <a:lstStyle/>
                     <a:p>
-                      <a:endParaRPr lang="en-GB"/>
+                      <a:r>
+                        <a:rPr lang="en-GB" dirty="0"/>
+                        <a:t>Support z, dynamically display</a:t>
+                      </a:r>
                     </a:p>
                   </a:txBody>
                   <a:tcPr/>
@@ -4650,7 +5468,27 @@
                     <a:bodyPr/>
                     <a:lstStyle/>
                     <a:p>
-                      <a:endParaRPr lang="en-GB"/>
+                      <a:pPr marL="0" marR="0" lvl="0" indent="0" algn="l" defTabSz="914400" rtl="0" eaLnBrk="1" fontAlgn="auto" latinLnBrk="0" hangingPunct="1">
+                        <a:lnSpc>
+                          <a:spcPct val="100000"/>
+                        </a:lnSpc>
+                        <a:spcBef>
+                          <a:spcPts val="0"/>
+                        </a:spcBef>
+                        <a:spcAft>
+                          <a:spcPts val="0"/>
+                        </a:spcAft>
+                        <a:buClrTx/>
+                        <a:buSzTx/>
+                        <a:buFontTx/>
+                        <a:buNone/>
+                        <a:tabLst/>
+                        <a:defRPr/>
+                      </a:pPr>
+                      <a:r>
+                        <a:rPr lang="en-GB" dirty="0"/>
+                        <a:t>❌</a:t>
+                      </a:r>
                     </a:p>
                   </a:txBody>
                   <a:tcPr/>
@@ -4660,7 +5498,10 @@
                     <a:bodyPr/>
                     <a:lstStyle/>
                     <a:p>
-                      <a:endParaRPr lang="en-GB" dirty="0"/>
+                      <a:r>
+                        <a:rPr lang="en-GB" dirty="0"/>
+                        <a:t>Implement</a:t>
+                      </a:r>
                     </a:p>
                   </a:txBody>
                   <a:tcPr/>
@@ -4668,6 +5509,195 @@
                 <a:extLst>
                   <a:ext uri="{0D108BD9-81ED-4DB2-BD59-A6C34878D82A}">
                     <a16:rowId xmlns:a16="http://schemas.microsoft.com/office/drawing/2014/main" val="1560789413"/>
+                  </a:ext>
+                </a:extLst>
+              </a:tr>
+              <a:tr h="370840">
+                <a:tc>
+                  <a:txBody>
+                    <a:bodyPr/>
+                    <a:lstStyle/>
+                    <a:p>
+                      <a:r>
+                        <a:rPr lang="en-GB" dirty="0"/>
+                        <a:t>Calculator Input</a:t>
+                      </a:r>
+                    </a:p>
+                  </a:txBody>
+                  <a:tcPr/>
+                </a:tc>
+                <a:tc>
+                  <a:txBody>
+                    <a:bodyPr/>
+                    <a:lstStyle/>
+                    <a:p>
+                      <a:pPr marL="0" marR="0" lvl="0" indent="0" algn="l" defTabSz="914400" rtl="0" eaLnBrk="1" fontAlgn="auto" latinLnBrk="0" hangingPunct="1">
+                        <a:lnSpc>
+                          <a:spcPct val="100000"/>
+                        </a:lnSpc>
+                        <a:spcBef>
+                          <a:spcPts val="0"/>
+                        </a:spcBef>
+                        <a:spcAft>
+                          <a:spcPts val="0"/>
+                        </a:spcAft>
+                        <a:buClrTx/>
+                        <a:buSzTx/>
+                        <a:buFontTx/>
+                        <a:buNone/>
+                        <a:tabLst/>
+                        <a:defRPr/>
+                      </a:pPr>
+                      <a:r>
+                        <a:rPr lang="en-GB" dirty="0"/>
+                        <a:t>✅</a:t>
+                      </a:r>
+                    </a:p>
+                  </a:txBody>
+                  <a:tcPr/>
+                </a:tc>
+                <a:tc>
+                  <a:txBody>
+                    <a:bodyPr/>
+                    <a:lstStyle/>
+                    <a:p>
+                      <a:r>
+                        <a:rPr lang="en-GB" dirty="0"/>
+                        <a:t>Add more buttons</a:t>
+                      </a:r>
+                    </a:p>
+                  </a:txBody>
+                  <a:tcPr/>
+                </a:tc>
+                <a:extLst>
+                  <a:ext uri="{0D108BD9-81ED-4DB2-BD59-A6C34878D82A}">
+                    <a16:rowId xmlns:a16="http://schemas.microsoft.com/office/drawing/2014/main" val="2402393554"/>
+                  </a:ext>
+                </a:extLst>
+              </a:tr>
+              <a:tr h="370840">
+                <a:tc>
+                  <a:txBody>
+                    <a:bodyPr/>
+                    <a:lstStyle/>
+                    <a:p>
+                      <a:r>
+                        <a:rPr lang="en-GB" dirty="0"/>
+                        <a:t>Formats input</a:t>
+                      </a:r>
+                    </a:p>
+                  </a:txBody>
+                  <a:tcPr/>
+                </a:tc>
+                <a:tc>
+                  <a:txBody>
+                    <a:bodyPr/>
+                    <a:lstStyle/>
+                    <a:p>
+                      <a:pPr marL="0" marR="0" lvl="0" indent="0" algn="l" defTabSz="914400" rtl="0" eaLnBrk="1" fontAlgn="auto" latinLnBrk="0" hangingPunct="1">
+                        <a:lnSpc>
+                          <a:spcPct val="100000"/>
+                        </a:lnSpc>
+                        <a:spcBef>
+                          <a:spcPts val="0"/>
+                        </a:spcBef>
+                        <a:spcAft>
+                          <a:spcPts val="0"/>
+                        </a:spcAft>
+                        <a:buClrTx/>
+                        <a:buSzTx/>
+                        <a:buFontTx/>
+                        <a:buNone/>
+                        <a:tabLst/>
+                        <a:defRPr/>
+                      </a:pPr>
+                      <a:r>
+                        <a:rPr lang="en-GB" dirty="0"/>
+                        <a:t>✅</a:t>
+                      </a:r>
+                    </a:p>
+                  </a:txBody>
+                  <a:tcPr/>
+                </a:tc>
+                <a:tc>
+                  <a:txBody>
+                    <a:bodyPr/>
+                    <a:lstStyle/>
+                    <a:p>
+                      <a:r>
+                        <a:rPr lang="en-GB" dirty="0"/>
+                        <a:t>Add more edge cases</a:t>
+                      </a:r>
+                    </a:p>
+                  </a:txBody>
+                  <a:tcPr/>
+                </a:tc>
+                <a:extLst>
+                  <a:ext uri="{0D108BD9-81ED-4DB2-BD59-A6C34878D82A}">
+                    <a16:rowId xmlns:a16="http://schemas.microsoft.com/office/drawing/2014/main" val="3848857006"/>
+                  </a:ext>
+                </a:extLst>
+              </a:tr>
+              <a:tr h="370840">
+                <a:tc>
+                  <a:txBody>
+                    <a:bodyPr/>
+                    <a:lstStyle/>
+                    <a:p>
+                      <a:r>
+                        <a:rPr lang="en-GB" dirty="0"/>
+                        <a:t>Error handling</a:t>
+                      </a:r>
+                    </a:p>
+                  </a:txBody>
+                  <a:tcPr/>
+                </a:tc>
+                <a:tc>
+                  <a:txBody>
+                    <a:bodyPr/>
+                    <a:lstStyle/>
+                    <a:p>
+                      <a:pPr marL="0" marR="0" lvl="0" indent="0" algn="l" defTabSz="914400" rtl="0" eaLnBrk="1" fontAlgn="auto" latinLnBrk="0" hangingPunct="1">
+                        <a:lnSpc>
+                          <a:spcPct val="100000"/>
+                        </a:lnSpc>
+                        <a:spcBef>
+                          <a:spcPts val="0"/>
+                        </a:spcBef>
+                        <a:spcAft>
+                          <a:spcPts val="0"/>
+                        </a:spcAft>
+                        <a:buClrTx/>
+                        <a:buSzTx/>
+                        <a:buFontTx/>
+                        <a:buNone/>
+                        <a:tabLst/>
+                        <a:defRPr/>
+                      </a:pPr>
+                      <a:r>
+                        <a:rPr lang="en-GB" dirty="0"/>
+                        <a:t>✅</a:t>
+                      </a:r>
+                    </a:p>
+                  </a:txBody>
+                  <a:tcPr/>
+                </a:tc>
+                <a:tc>
+                  <a:txBody>
+                    <a:bodyPr/>
+                    <a:lstStyle/>
+                    <a:p>
+                      <a:r>
+                        <a:rPr lang="en-GB" dirty="0"/>
+                        <a:t>Display error more aesthetically </a:t>
+                      </a:r>
+                    </a:p>
+                  </a:txBody>
+                  <a:tcPr/>
+                </a:tc>
+                <a:extLst>
+                  <a:ext uri="{0D108BD9-81ED-4DB2-BD59-A6C34878D82A}">
+                    <a16:rowId xmlns:a16="http://schemas.microsoft.com/office/drawing/2014/main" val="221518608"/>
                   </a:ext>
                 </a:extLst>
               </a:tr>
@@ -4679,6 +5709,276 @@
     <p:extLst>
       <p:ext uri="{BB962C8B-B14F-4D97-AF65-F5344CB8AC3E}">
         <p14:creationId xmlns:p14="http://schemas.microsoft.com/office/powerpoint/2010/main" val="2053875609"/>
+      </p:ext>
+    </p:extLst>
+  </p:cSld>
+  <p:clrMapOvr>
+    <a:masterClrMapping/>
+  </p:clrMapOvr>
+</p:sld>
+</file>
+
+<file path=ppt/slides/slide5.xml><?xml version="1.0" encoding="utf-8"?>
+<p:sld xmlns:a="http://schemas.openxmlformats.org/drawingml/2006/main" xmlns:r="http://schemas.openxmlformats.org/officeDocument/2006/relationships" xmlns:p="http://schemas.openxmlformats.org/presentationml/2006/main">
+  <p:cSld>
+    <p:spTree>
+      <p:nvGrpSpPr>
+        <p:cNvPr id="1" name=""/>
+        <p:cNvGrpSpPr/>
+        <p:nvPr/>
+      </p:nvGrpSpPr>
+      <p:grpSpPr>
+        <a:xfrm>
+          <a:off x="0" y="0"/>
+          <a:ext cx="0" cy="0"/>
+          <a:chOff x="0" y="0"/>
+          <a:chExt cx="0" cy="0"/>
+        </a:xfrm>
+      </p:grpSpPr>
+      <p:sp>
+        <p:nvSpPr>
+          <p:cNvPr id="2" name="Title 1">
+            <a:extLst>
+              <a:ext uri="{FF2B5EF4-FFF2-40B4-BE49-F238E27FC236}">
+                <a16:creationId xmlns:a16="http://schemas.microsoft.com/office/drawing/2014/main" id="{4FDD032B-C98E-B54A-CC85-742FDEBEB826}"/>
+              </a:ext>
+            </a:extLst>
+          </p:cNvPr>
+          <p:cNvSpPr>
+            <a:spLocks noGrp="1"/>
+          </p:cNvSpPr>
+          <p:nvPr>
+            <p:ph type="title"/>
+          </p:nvPr>
+        </p:nvSpPr>
+        <p:spPr>
+          <a:xfrm>
+            <a:off x="838200" y="365126"/>
+            <a:ext cx="10974572" cy="1251024"/>
+          </a:xfrm>
+        </p:spPr>
+        <p:txBody>
+          <a:bodyPr/>
+          <a:lstStyle/>
+          <a:p>
+            <a:r>
+              <a:rPr lang="en-GB" dirty="0"/>
+              <a:t>How systems are solved (Gaussian elimination)</a:t>
+            </a:r>
+          </a:p>
+        </p:txBody>
+      </p:sp>
+      <p:pic>
+        <p:nvPicPr>
+          <p:cNvPr id="2052" name="Picture 4" descr="Represent linear systems with matrices (practice) | Khan Academy">
+            <a:extLst>
+              <a:ext uri="{FF2B5EF4-FFF2-40B4-BE49-F238E27FC236}">
+                <a16:creationId xmlns:a16="http://schemas.microsoft.com/office/drawing/2014/main" id="{8800D42F-06F7-6EB2-597A-7CA138647ED2}"/>
+              </a:ext>
+            </a:extLst>
+          </p:cNvPr>
+          <p:cNvPicPr>
+            <a:picLocks noChangeAspect="1" noChangeArrowheads="1"/>
+          </p:cNvPicPr>
+          <p:nvPr/>
+        </p:nvPicPr>
+        <p:blipFill>
+          <a:blip r:embed="rId3">
+            <a:extLst>
+              <a:ext uri="{28A0092B-C50C-407E-A947-70E740481C1C}">
+                <a14:useLocalDpi xmlns:a14="http://schemas.microsoft.com/office/drawing/2010/main" val="0"/>
+              </a:ext>
+            </a:extLst>
+          </a:blip>
+          <a:srcRect/>
+          <a:stretch>
+            <a:fillRect/>
+          </a:stretch>
+        </p:blipFill>
+        <p:spPr bwMode="auto">
+          <a:xfrm>
+            <a:off x="475216" y="2153092"/>
+            <a:ext cx="5850270" cy="3290777"/>
+          </a:xfrm>
+          <a:prstGeom prst="rect">
+            <a:avLst/>
+          </a:prstGeom>
+          <a:noFill/>
+          <a:extLst>
+            <a:ext uri="{909E8E84-426E-40DD-AFC4-6F175D3DCCD1}">
+              <a14:hiddenFill xmlns:a14="http://schemas.microsoft.com/office/drawing/2010/main">
+                <a:solidFill>
+                  <a:srgbClr val="FFFFFF"/>
+                </a:solidFill>
+              </a14:hiddenFill>
+            </a:ext>
+          </a:extLst>
+        </p:spPr>
+      </p:pic>
+      <p:pic>
+        <p:nvPicPr>
+          <p:cNvPr id="2054" name="Picture 6" descr="Newton Raphson Method | Definition, Formula, Examples &amp; Calculation">
+            <a:extLst>
+              <a:ext uri="{FF2B5EF4-FFF2-40B4-BE49-F238E27FC236}">
+                <a16:creationId xmlns:a16="http://schemas.microsoft.com/office/drawing/2014/main" id="{55F300D8-0BBC-A8F8-BD9A-A2106940E444}"/>
+              </a:ext>
+            </a:extLst>
+          </p:cNvPr>
+          <p:cNvPicPr>
+            <a:picLocks noChangeAspect="1" noChangeArrowheads="1"/>
+          </p:cNvPicPr>
+          <p:nvPr/>
+        </p:nvPicPr>
+        <p:blipFill>
+          <a:blip r:embed="rId4">
+            <a:extLst>
+              <a:ext uri="{28A0092B-C50C-407E-A947-70E740481C1C}">
+                <a14:useLocalDpi xmlns:a14="http://schemas.microsoft.com/office/drawing/2010/main" val="0"/>
+              </a:ext>
+            </a:extLst>
+          </a:blip>
+          <a:srcRect/>
+          <a:stretch>
+            <a:fillRect/>
+          </a:stretch>
+        </p:blipFill>
+        <p:spPr bwMode="auto">
+          <a:xfrm>
+            <a:off x="6598220" y="1616150"/>
+            <a:ext cx="5012533" cy="4302567"/>
+          </a:xfrm>
+          <a:prstGeom prst="rect">
+            <a:avLst/>
+          </a:prstGeom>
+          <a:noFill/>
+          <a:extLst>
+            <a:ext uri="{909E8E84-426E-40DD-AFC4-6F175D3DCCD1}">
+              <a14:hiddenFill xmlns:a14="http://schemas.microsoft.com/office/drawing/2010/main">
+                <a:solidFill>
+                  <a:srgbClr val="FFFFFF"/>
+                </a:solidFill>
+              </a14:hiddenFill>
+            </a:ext>
+          </a:extLst>
+        </p:spPr>
+      </p:pic>
+    </p:spTree>
+    <p:extLst>
+      <p:ext uri="{BB962C8B-B14F-4D97-AF65-F5344CB8AC3E}">
+        <p14:creationId xmlns:p14="http://schemas.microsoft.com/office/powerpoint/2010/main" val="891325863"/>
+      </p:ext>
+    </p:extLst>
+  </p:cSld>
+  <p:clrMapOvr>
+    <a:masterClrMapping/>
+  </p:clrMapOvr>
+</p:sld>
+</file>
+
+<file path=ppt/slides/slide6.xml><?xml version="1.0" encoding="utf-8"?>
+<p:sld xmlns:a="http://schemas.openxmlformats.org/drawingml/2006/main" xmlns:r="http://schemas.openxmlformats.org/officeDocument/2006/relationships" xmlns:p="http://schemas.openxmlformats.org/presentationml/2006/main">
+  <p:cSld>
+    <p:spTree>
+      <p:nvGrpSpPr>
+        <p:cNvPr id="1" name=""/>
+        <p:cNvGrpSpPr/>
+        <p:nvPr/>
+      </p:nvGrpSpPr>
+      <p:grpSpPr>
+        <a:xfrm>
+          <a:off x="0" y="0"/>
+          <a:ext cx="0" cy="0"/>
+          <a:chOff x="0" y="0"/>
+          <a:chExt cx="0" cy="0"/>
+        </a:xfrm>
+      </p:grpSpPr>
+      <p:sp>
+        <p:nvSpPr>
+          <p:cNvPr id="2" name="Title 1">
+            <a:extLst>
+              <a:ext uri="{FF2B5EF4-FFF2-40B4-BE49-F238E27FC236}">
+                <a16:creationId xmlns:a16="http://schemas.microsoft.com/office/drawing/2014/main" id="{471DD854-DC34-127A-67F8-398B2ACE2434}"/>
+              </a:ext>
+            </a:extLst>
+          </p:cNvPr>
+          <p:cNvSpPr>
+            <a:spLocks noGrp="1"/>
+          </p:cNvSpPr>
+          <p:nvPr>
+            <p:ph type="title"/>
+          </p:nvPr>
+        </p:nvSpPr>
+        <p:spPr/>
+        <p:txBody>
+          <a:bodyPr/>
+          <a:lstStyle/>
+          <a:p>
+            <a:r>
+              <a:rPr lang="en-GB" dirty="0"/>
+              <a:t>How high order polynomials are solved (newton </a:t>
+            </a:r>
+            <a:r>
+              <a:rPr lang="en-GB" dirty="0" err="1"/>
+              <a:t>rhapson</a:t>
+            </a:r>
+            <a:r>
+              <a:rPr lang="en-GB" dirty="0"/>
+              <a:t>)</a:t>
+            </a:r>
+          </a:p>
+        </p:txBody>
+      </p:sp>
+      <p:pic>
+        <p:nvPicPr>
+          <p:cNvPr id="3074" name="Picture 2" descr="Newton-Raphson Technique">
+            <a:extLst>
+              <a:ext uri="{FF2B5EF4-FFF2-40B4-BE49-F238E27FC236}">
+                <a16:creationId xmlns:a16="http://schemas.microsoft.com/office/drawing/2014/main" id="{4CF93645-1969-B57A-18B1-AE9EBE3092AA}"/>
+              </a:ext>
+            </a:extLst>
+          </p:cNvPr>
+          <p:cNvPicPr>
+            <a:picLocks noChangeAspect="1" noChangeArrowheads="1"/>
+          </p:cNvPicPr>
+          <p:nvPr/>
+        </p:nvPicPr>
+        <p:blipFill>
+          <a:blip r:embed="rId2">
+            <a:extLst>
+              <a:ext uri="{28A0092B-C50C-407E-A947-70E740481C1C}">
+                <a14:useLocalDpi xmlns:a14="http://schemas.microsoft.com/office/drawing/2010/main" val="0"/>
+              </a:ext>
+            </a:extLst>
+          </a:blip>
+          <a:srcRect/>
+          <a:stretch>
+            <a:fillRect/>
+          </a:stretch>
+        </p:blipFill>
+        <p:spPr bwMode="auto">
+          <a:xfrm>
+            <a:off x="838200" y="2502750"/>
+            <a:ext cx="4759973" cy="2260636"/>
+          </a:xfrm>
+          <a:prstGeom prst="rect">
+            <a:avLst/>
+          </a:prstGeom>
+          <a:noFill/>
+          <a:extLst>
+            <a:ext uri="{909E8E84-426E-40DD-AFC4-6F175D3DCCD1}">
+              <a14:hiddenFill xmlns:a14="http://schemas.microsoft.com/office/drawing/2010/main">
+                <a:solidFill>
+                  <a:srgbClr val="FFFFFF"/>
+                </a:solidFill>
+              </a14:hiddenFill>
+            </a:ext>
+          </a:extLst>
+        </p:spPr>
+      </p:pic>
+    </p:spTree>
+    <p:extLst>
+      <p:ext uri="{BB962C8B-B14F-4D97-AF65-F5344CB8AC3E}">
+        <p14:creationId xmlns:p14="http://schemas.microsoft.com/office/powerpoint/2010/main" val="4094681318"/>
       </p:ext>
     </p:extLst>
   </p:cSld>

</xml_diff>